<commit_message>
Updated spec with comments received; added a section on external object names
</commit_message>
<xml_diff>
--- a/v1.2/spec/P4v1.2-spec.pptx
+++ b/v1.2/spec/P4v1.2-spec.pptx
@@ -5,7 +5,7 @@
     <p:sldMasterId id="2147483648" r:id="rId1"/>
   </p:sldMasterIdLst>
   <p:notesMasterIdLst>
-    <p:notesMasterId r:id="rId20"/>
+    <p:notesMasterId r:id="rId21"/>
   </p:notesMasterIdLst>
   <p:sldIdLst>
     <p:sldId id="256" r:id="rId2"/>
@@ -26,6 +26,7 @@
     <p:sldId id="276" r:id="rId17"/>
     <p:sldId id="279" r:id="rId18"/>
     <p:sldId id="280" r:id="rId19"/>
+    <p:sldId id="282" r:id="rId20"/>
   </p:sldIdLst>
   <p:sldSz cx="9144000" cy="6858000" type="screen4x3"/>
   <p:notesSz cx="6858000" cy="9144000"/>
@@ -225,7 +226,7 @@
           <a:p>
             <a:fld id="{DED3B27D-5B62-AC40-B6AC-59B5C583BAA4}" type="datetimeFigureOut">
               <a:rPr lang="en-US" smtClean="0"/>
-              <a:t>4/12/16</a:t>
+              <a:t>4/29/16</a:t>
             </a:fld>
             <a:endParaRPr lang="en-US"/>
           </a:p>
@@ -671,7 +672,7 @@
           <a:p>
             <a:fld id="{E5FA88D9-A900-BE49-8FB1-39E9E0AFC9E6}" type="datetimeFigureOut">
               <a:rPr lang="en-US" smtClean="0"/>
-              <a:t>4/12/16</a:t>
+              <a:t>4/29/16</a:t>
             </a:fld>
             <a:endParaRPr lang="en-US"/>
           </a:p>
@@ -839,7 +840,7 @@
           <a:p>
             <a:fld id="{E5FA88D9-A900-BE49-8FB1-39E9E0AFC9E6}" type="datetimeFigureOut">
               <a:rPr lang="en-US" smtClean="0"/>
-              <a:t>4/12/16</a:t>
+              <a:t>4/29/16</a:t>
             </a:fld>
             <a:endParaRPr lang="en-US"/>
           </a:p>
@@ -1017,7 +1018,7 @@
           <a:p>
             <a:fld id="{E5FA88D9-A900-BE49-8FB1-39E9E0AFC9E6}" type="datetimeFigureOut">
               <a:rPr lang="en-US" smtClean="0"/>
-              <a:t>4/12/16</a:t>
+              <a:t>4/29/16</a:t>
             </a:fld>
             <a:endParaRPr lang="en-US"/>
           </a:p>
@@ -1185,7 +1186,7 @@
           <a:p>
             <a:fld id="{E5FA88D9-A900-BE49-8FB1-39E9E0AFC9E6}" type="datetimeFigureOut">
               <a:rPr lang="en-US" smtClean="0"/>
-              <a:t>4/12/16</a:t>
+              <a:t>4/29/16</a:t>
             </a:fld>
             <a:endParaRPr lang="en-US"/>
           </a:p>
@@ -1430,7 +1431,7 @@
           <a:p>
             <a:fld id="{E5FA88D9-A900-BE49-8FB1-39E9E0AFC9E6}" type="datetimeFigureOut">
               <a:rPr lang="en-US" smtClean="0"/>
-              <a:t>4/12/16</a:t>
+              <a:t>4/29/16</a:t>
             </a:fld>
             <a:endParaRPr lang="en-US"/>
           </a:p>
@@ -1715,7 +1716,7 @@
           <a:p>
             <a:fld id="{E5FA88D9-A900-BE49-8FB1-39E9E0AFC9E6}" type="datetimeFigureOut">
               <a:rPr lang="en-US" smtClean="0"/>
-              <a:t>4/12/16</a:t>
+              <a:t>4/29/16</a:t>
             </a:fld>
             <a:endParaRPr lang="en-US"/>
           </a:p>
@@ -2134,7 +2135,7 @@
           <a:p>
             <a:fld id="{E5FA88D9-A900-BE49-8FB1-39E9E0AFC9E6}" type="datetimeFigureOut">
               <a:rPr lang="en-US" smtClean="0"/>
-              <a:t>4/12/16</a:t>
+              <a:t>4/29/16</a:t>
             </a:fld>
             <a:endParaRPr lang="en-US"/>
           </a:p>
@@ -2251,7 +2252,7 @@
           <a:p>
             <a:fld id="{E5FA88D9-A900-BE49-8FB1-39E9E0AFC9E6}" type="datetimeFigureOut">
               <a:rPr lang="en-US" smtClean="0"/>
-              <a:t>4/12/16</a:t>
+              <a:t>4/29/16</a:t>
             </a:fld>
             <a:endParaRPr lang="en-US"/>
           </a:p>
@@ -2346,7 +2347,7 @@
           <a:p>
             <a:fld id="{E5FA88D9-A900-BE49-8FB1-39E9E0AFC9E6}" type="datetimeFigureOut">
               <a:rPr lang="en-US" smtClean="0"/>
-              <a:t>4/12/16</a:t>
+              <a:t>4/29/16</a:t>
             </a:fld>
             <a:endParaRPr lang="en-US"/>
           </a:p>
@@ -2621,7 +2622,7 @@
           <a:p>
             <a:fld id="{E5FA88D9-A900-BE49-8FB1-39E9E0AFC9E6}" type="datetimeFigureOut">
               <a:rPr lang="en-US" smtClean="0"/>
-              <a:t>4/12/16</a:t>
+              <a:t>4/29/16</a:t>
             </a:fld>
             <a:endParaRPr lang="en-US"/>
           </a:p>
@@ -2873,7 +2874,7 @@
           <a:p>
             <a:fld id="{E5FA88D9-A900-BE49-8FB1-39E9E0AFC9E6}" type="datetimeFigureOut">
               <a:rPr lang="en-US" smtClean="0"/>
-              <a:t>4/12/16</a:t>
+              <a:t>4/29/16</a:t>
             </a:fld>
             <a:endParaRPr lang="en-US"/>
           </a:p>
@@ -3084,7 +3085,7 @@
           <a:p>
             <a:fld id="{E5FA88D9-A900-BE49-8FB1-39E9E0AFC9E6}" type="datetimeFigureOut">
               <a:rPr lang="en-US" smtClean="0"/>
-              <a:t>4/12/16</a:t>
+              <a:t>4/29/16</a:t>
             </a:fld>
             <a:endParaRPr lang="en-US"/>
           </a:p>
@@ -7030,14 +7031,14 @@
                 <a:gridCol w="1207821">
                   <a:extLst>
                     <a:ext uri="{9D8B030D-6E8A-4147-A177-3AD203B41FA5}">
-                      <a16:colId xmlns:a16="http://schemas.microsoft.com/office/drawing/2014/main" xmlns="" val="20000"/>
+                      <a16:colId xmlns="" xmlns:a16="http://schemas.microsoft.com/office/drawing/2014/main" val="20000"/>
                     </a:ext>
                   </a:extLst>
                 </a:gridCol>
                 <a:gridCol w="1233947">
                   <a:extLst>
                     <a:ext uri="{9D8B030D-6E8A-4147-A177-3AD203B41FA5}">
-                      <a16:colId xmlns:a16="http://schemas.microsoft.com/office/drawing/2014/main" xmlns="" val="20001"/>
+                      <a16:colId xmlns="" xmlns:a16="http://schemas.microsoft.com/office/drawing/2014/main" val="20001"/>
                     </a:ext>
                   </a:extLst>
                 </a:gridCol>
@@ -7071,7 +7072,7 @@
                 </a:tc>
                 <a:extLst>
                   <a:ext uri="{0D108BD9-81ED-4DB2-BD59-A6C34878D82A}">
-                    <a16:rowId xmlns:a16="http://schemas.microsoft.com/office/drawing/2014/main" xmlns="" val="10000"/>
+                    <a16:rowId xmlns="" xmlns:a16="http://schemas.microsoft.com/office/drawing/2014/main" val="10000"/>
                   </a:ext>
                 </a:extLst>
               </a:tr>
@@ -7098,7 +7099,7 @@
                 </a:tc>
                 <a:extLst>
                   <a:ext uri="{0D108BD9-81ED-4DB2-BD59-A6C34878D82A}">
-                    <a16:rowId xmlns:a16="http://schemas.microsoft.com/office/drawing/2014/main" xmlns="" val="10001"/>
+                    <a16:rowId xmlns="" xmlns:a16="http://schemas.microsoft.com/office/drawing/2014/main" val="10001"/>
                   </a:ext>
                 </a:extLst>
               </a:tr>
@@ -7125,7 +7126,7 @@
                 </a:tc>
                 <a:extLst>
                   <a:ext uri="{0D108BD9-81ED-4DB2-BD59-A6C34878D82A}">
-                    <a16:rowId xmlns:a16="http://schemas.microsoft.com/office/drawing/2014/main" xmlns="" val="10002"/>
+                    <a16:rowId xmlns="" xmlns:a16="http://schemas.microsoft.com/office/drawing/2014/main" val="10002"/>
                   </a:ext>
                 </a:extLst>
               </a:tr>
@@ -7172,7 +7173,7 @@
                 </a:tc>
                 <a:extLst>
                   <a:ext uri="{0D108BD9-81ED-4DB2-BD59-A6C34878D82A}">
-                    <a16:rowId xmlns:a16="http://schemas.microsoft.com/office/drawing/2014/main" xmlns="" val="10003"/>
+                    <a16:rowId xmlns="" xmlns:a16="http://schemas.microsoft.com/office/drawing/2014/main" val="10003"/>
                   </a:ext>
                 </a:extLst>
               </a:tr>
@@ -7199,7 +7200,7 @@
                 </a:tc>
                 <a:extLst>
                   <a:ext uri="{0D108BD9-81ED-4DB2-BD59-A6C34878D82A}">
-                    <a16:rowId xmlns:a16="http://schemas.microsoft.com/office/drawing/2014/main" xmlns="" val="10004"/>
+                    <a16:rowId xmlns="" xmlns:a16="http://schemas.microsoft.com/office/drawing/2014/main" val="10004"/>
                   </a:ext>
                 </a:extLst>
               </a:tr>
@@ -7226,7 +7227,7 @@
                 </a:tc>
                 <a:extLst>
                   <a:ext uri="{0D108BD9-81ED-4DB2-BD59-A6C34878D82A}">
-                    <a16:rowId xmlns:a16="http://schemas.microsoft.com/office/drawing/2014/main" xmlns="" val="10005"/>
+                    <a16:rowId xmlns="" xmlns:a16="http://schemas.microsoft.com/office/drawing/2014/main" val="10005"/>
                   </a:ext>
                 </a:extLst>
               </a:tr>
@@ -11024,13 +11025,18 @@
         </p:nvSpPr>
         <p:spPr>
           <a:xfrm>
-            <a:off x="1784555" y="1116412"/>
-            <a:ext cx="809837" cy="461665"/>
+            <a:off x="1940126" y="1396860"/>
+            <a:ext cx="1895391" cy="461665"/>
           </a:xfrm>
           <a:prstGeom prst="rect">
             <a:avLst/>
           </a:prstGeom>
-          <a:noFill/>
+          <a:solidFill>
+            <a:schemeClr val="accent6">
+              <a:lumMod val="20000"/>
+              <a:lumOff val="80000"/>
+            </a:schemeClr>
+          </a:solidFill>
         </p:spPr>
         <p:txBody>
           <a:bodyPr wrap="none" rtlCol="0">
@@ -11039,10 +11045,10 @@
           <a:lstStyle/>
           <a:p>
             <a:r>
-              <a:rPr lang="en-US" sz="2400" smtClean="0"/>
-              <a:t>main</a:t>
-            </a:r>
-            <a:endParaRPr lang="en-US" sz="2400"/>
+              <a:rPr lang="en-US" sz="2400" dirty="0" smtClean="0"/>
+              <a:t>package main</a:t>
+            </a:r>
+            <a:endParaRPr lang="en-US" sz="2400" dirty="0"/>
           </a:p>
         </p:txBody>
       </p:sp>
@@ -11250,13 +11256,18 @@
         </p:nvSpPr>
         <p:spPr>
           <a:xfrm>
-            <a:off x="2263877" y="2020529"/>
-            <a:ext cx="1415452" cy="461665"/>
+            <a:off x="2337108" y="1941626"/>
+            <a:ext cx="1430905" cy="461665"/>
           </a:xfrm>
           <a:prstGeom prst="rect">
             <a:avLst/>
           </a:prstGeom>
-          <a:noFill/>
+          <a:solidFill>
+            <a:schemeClr val="accent6">
+              <a:lumMod val="20000"/>
+              <a:lumOff val="80000"/>
+            </a:schemeClr>
+          </a:solidFill>
         </p:spPr>
         <p:txBody>
           <a:bodyPr wrap="none" rtlCol="0">
@@ -11265,8 +11276,12 @@
           <a:lstStyle/>
           <a:p>
             <a:r>
-              <a:rPr lang="en-US" sz="2400" smtClean="0"/>
-              <a:t>TopParser</a:t>
+              <a:rPr lang="en-US" sz="2400" dirty="0" smtClean="0"/>
+              <a:t>parser </a:t>
+            </a:r>
+            <a:r>
+              <a:rPr lang="en-US" sz="2400" dirty="0" err="1" smtClean="0"/>
+              <a:t>prs</a:t>
             </a:r>
             <a:endParaRPr lang="en-US" sz="2400" dirty="0"/>
           </a:p>
@@ -11280,13 +11295,18 @@
         </p:nvSpPr>
         <p:spPr>
           <a:xfrm>
-            <a:off x="2263877" y="4338936"/>
-            <a:ext cx="1768176" cy="461665"/>
+            <a:off x="2337108" y="4242376"/>
+            <a:ext cx="1617238" cy="461665"/>
           </a:xfrm>
           <a:prstGeom prst="rect">
             <a:avLst/>
           </a:prstGeom>
-          <a:noFill/>
+          <a:solidFill>
+            <a:schemeClr val="accent6">
+              <a:lumMod val="20000"/>
+              <a:lumOff val="80000"/>
+            </a:schemeClr>
+          </a:solidFill>
         </p:spPr>
         <p:txBody>
           <a:bodyPr wrap="none" rtlCol="0">
@@ -11295,8 +11315,12 @@
           <a:lstStyle/>
           <a:p>
             <a:r>
-              <a:rPr lang="en-US" sz="2400" smtClean="0"/>
-              <a:t>TopDeparser</a:t>
+              <a:rPr lang="en-US" sz="2400" dirty="0" smtClean="0"/>
+              <a:t>control </a:t>
+            </a:r>
+            <a:r>
+              <a:rPr lang="en-US" sz="2400" dirty="0" err="1" smtClean="0"/>
+              <a:t>dep</a:t>
             </a:r>
             <a:endParaRPr lang="en-US" sz="2400" dirty="0"/>
           </a:p>
@@ -11310,13 +11334,18 @@
         </p:nvSpPr>
         <p:spPr>
           <a:xfrm>
-            <a:off x="2285606" y="3170904"/>
-            <a:ext cx="729687" cy="461665"/>
+            <a:off x="2339169" y="3058077"/>
+            <a:ext cx="1549911" cy="461665"/>
           </a:xfrm>
           <a:prstGeom prst="rect">
             <a:avLst/>
           </a:prstGeom>
-          <a:noFill/>
+          <a:solidFill>
+            <a:schemeClr val="accent6">
+              <a:lumMod val="20000"/>
+              <a:lumOff val="80000"/>
+            </a:schemeClr>
+          </a:solidFill>
         </p:spPr>
         <p:txBody>
           <a:bodyPr wrap="none" rtlCol="0">
@@ -11326,7 +11355,7 @@
           <a:p>
             <a:r>
               <a:rPr lang="en-US" sz="2400" dirty="0" smtClean="0"/>
-              <a:t>Pipe</a:t>
+              <a:t>control ctrl</a:t>
             </a:r>
             <a:endParaRPr lang="en-US" sz="2400" dirty="0"/>
           </a:p>
@@ -11340,13 +11369,18 @@
         </p:nvSpPr>
         <p:spPr>
           <a:xfrm>
-            <a:off x="6245942" y="2517509"/>
+            <a:off x="6341010" y="2709239"/>
             <a:ext cx="764953" cy="461665"/>
           </a:xfrm>
           <a:prstGeom prst="rect">
             <a:avLst/>
           </a:prstGeom>
-          <a:noFill/>
+          <a:solidFill>
+            <a:schemeClr val="accent6">
+              <a:lumMod val="20000"/>
+              <a:lumOff val="80000"/>
+            </a:schemeClr>
+          </a:solidFill>
         </p:spPr>
         <p:txBody>
           <a:bodyPr wrap="none" rtlCol="0">
@@ -11366,19 +11400,18 @@
         <p:nvCxnSpPr>
           <p:cNvPr id="13" name="Elbow Connector 12"/>
           <p:cNvCxnSpPr>
-            <a:stCxn id="8" idx="3"/>
             <a:endCxn id="7" idx="1"/>
           </p:cNvCxnSpPr>
           <p:nvPr/>
         </p:nvCxnSpPr>
         <p:spPr>
           <a:xfrm>
-            <a:off x="3679329" y="2251362"/>
-            <a:ext cx="2566613" cy="1328808"/>
+            <a:off x="4159355" y="2446870"/>
+            <a:ext cx="2086587" cy="1133300"/>
           </a:xfrm>
           <a:prstGeom prst="bentConnector3">
             <a:avLst>
-              <a:gd name="adj1" fmla="val 93671"/>
+              <a:gd name="adj1" fmla="val 91761"/>
             </a:avLst>
           </a:prstGeom>
           <a:ln w="28575" cmpd="sng">
@@ -11408,19 +11441,18 @@
         <p:nvCxnSpPr>
           <p:cNvPr id="15" name="Elbow Connector 14"/>
           <p:cNvCxnSpPr>
-            <a:stCxn id="9" idx="3"/>
             <a:endCxn id="7" idx="1"/>
           </p:cNvCxnSpPr>
           <p:nvPr/>
         </p:nvCxnSpPr>
         <p:spPr>
           <a:xfrm flipV="1">
-            <a:off x="4032053" y="3580170"/>
-            <a:ext cx="2213889" cy="989599"/>
+            <a:off x="4378362" y="3580170"/>
+            <a:ext cx="1867580" cy="1256345"/>
           </a:xfrm>
           <a:prstGeom prst="bentConnector3">
             <a:avLst>
-              <a:gd name="adj1" fmla="val 92635"/>
+              <a:gd name="adj1" fmla="val 90897"/>
             </a:avLst>
           </a:prstGeom>
           <a:ln w="28575" cmpd="sng">
@@ -11446,10 +11478,716 @@
           </a:fontRef>
         </p:style>
       </p:cxnSp>
+      <p:sp>
+        <p:nvSpPr>
+          <p:cNvPr id="14" name="Rectangle 13"/>
+          <p:cNvSpPr/>
+          <p:nvPr/>
+        </p:nvSpPr>
+        <p:spPr>
+          <a:xfrm>
+            <a:off x="1398494" y="1011218"/>
+            <a:ext cx="6164132" cy="4765637"/>
+          </a:xfrm>
+          <a:prstGeom prst="rect">
+            <a:avLst/>
+          </a:prstGeom>
+          <a:noFill/>
+          <a:ln w="38100" cmpd="sng">
+            <a:solidFill>
+              <a:schemeClr val="tx1"/>
+            </a:solidFill>
+          </a:ln>
+          <a:effectLst/>
+        </p:spPr>
+        <p:style>
+          <a:lnRef idx="1">
+            <a:schemeClr val="accent1"/>
+          </a:lnRef>
+          <a:fillRef idx="3">
+            <a:schemeClr val="accent1"/>
+          </a:fillRef>
+          <a:effectRef idx="2">
+            <a:schemeClr val="accent1"/>
+          </a:effectRef>
+          <a:fontRef idx="minor">
+            <a:schemeClr val="lt1"/>
+          </a:fontRef>
+        </p:style>
+        <p:txBody>
+          <a:bodyPr wrap="none" rtlCol="0" anchor="ctr"/>
+          <a:lstStyle/>
+          <a:p>
+            <a:pPr algn="ctr"/>
+            <a:endParaRPr lang="en-US" sz="3200" dirty="0" smtClean="0">
+              <a:solidFill>
+                <a:schemeClr val="tx1"/>
+              </a:solidFill>
+            </a:endParaRPr>
+          </a:p>
+        </p:txBody>
+      </p:sp>
+      <p:sp>
+        <p:nvSpPr>
+          <p:cNvPr id="16" name="TextBox 15"/>
+          <p:cNvSpPr txBox="1"/>
+          <p:nvPr/>
+        </p:nvSpPr>
+        <p:spPr>
+          <a:xfrm>
+            <a:off x="1527586" y="761167"/>
+            <a:ext cx="1192634" cy="461665"/>
+          </a:xfrm>
+          <a:prstGeom prst="rect">
+            <a:avLst/>
+          </a:prstGeom>
+          <a:solidFill>
+            <a:schemeClr val="accent6">
+              <a:lumMod val="20000"/>
+              <a:lumOff val="80000"/>
+            </a:schemeClr>
+          </a:solidFill>
+        </p:spPr>
+        <p:txBody>
+          <a:bodyPr wrap="none" rtlCol="0">
+            <a:spAutoFit/>
+          </a:bodyPr>
+          <a:lstStyle/>
+          <a:p>
+            <a:r>
+              <a:rPr lang="en-US" sz="2400" i="1" dirty="0" err="1" smtClean="0"/>
+              <a:t>toplevel</a:t>
+            </a:r>
+            <a:endParaRPr lang="en-US" sz="2400" i="1" dirty="0"/>
+          </a:p>
+        </p:txBody>
+      </p:sp>
     </p:spTree>
     <p:extLst>
       <p:ext uri="{BB962C8B-B14F-4D97-AF65-F5344CB8AC3E}">
         <p14:creationId xmlns:p14="http://schemas.microsoft.com/office/powerpoint/2010/main" val="2002696447"/>
+      </p:ext>
+    </p:extLst>
+  </p:cSld>
+  <p:clrMapOvr>
+    <a:masterClrMapping/>
+  </p:clrMapOvr>
+</p:sld>
+</file>
+
+<file path=ppt/slides/slide19.xml><?xml version="1.0" encoding="utf-8"?>
+<p:sld xmlns:a="http://schemas.openxmlformats.org/drawingml/2006/main" xmlns:r="http://schemas.openxmlformats.org/officeDocument/2006/relationships" xmlns:p="http://schemas.openxmlformats.org/presentationml/2006/main">
+  <p:cSld>
+    <p:spTree>
+      <p:nvGrpSpPr>
+        <p:cNvPr id="1" name=""/>
+        <p:cNvGrpSpPr/>
+        <p:nvPr/>
+      </p:nvGrpSpPr>
+      <p:grpSpPr>
+        <a:xfrm>
+          <a:off x="0" y="0"/>
+          <a:ext cx="0" cy="0"/>
+          <a:chOff x="0" y="0"/>
+          <a:chExt cx="0" cy="0"/>
+        </a:xfrm>
+      </p:grpSpPr>
+      <p:sp>
+        <p:nvSpPr>
+          <p:cNvPr id="2" name="Rectangle 1"/>
+          <p:cNvSpPr/>
+          <p:nvPr/>
+        </p:nvSpPr>
+        <p:spPr>
+          <a:xfrm>
+            <a:off x="1799304" y="1666567"/>
+            <a:ext cx="4114800" cy="3937820"/>
+          </a:xfrm>
+          <a:prstGeom prst="rect">
+            <a:avLst/>
+          </a:prstGeom>
+          <a:noFill/>
+          <a:ln w="38100" cmpd="sng">
+            <a:solidFill>
+              <a:schemeClr val="tx1"/>
+            </a:solidFill>
+          </a:ln>
+          <a:effectLst/>
+        </p:spPr>
+        <p:style>
+          <a:lnRef idx="1">
+            <a:schemeClr val="accent1"/>
+          </a:lnRef>
+          <a:fillRef idx="3">
+            <a:schemeClr val="accent1"/>
+          </a:fillRef>
+          <a:effectRef idx="2">
+            <a:schemeClr val="accent1"/>
+          </a:effectRef>
+          <a:fontRef idx="minor">
+            <a:schemeClr val="lt1"/>
+          </a:fontRef>
+        </p:style>
+        <p:txBody>
+          <a:bodyPr wrap="none" rtlCol="0" anchor="ctr"/>
+          <a:lstStyle/>
+          <a:p>
+            <a:pPr algn="ctr"/>
+            <a:endParaRPr lang="en-US" sz="3200" dirty="0" smtClean="0">
+              <a:solidFill>
+                <a:schemeClr val="tx1"/>
+              </a:solidFill>
+            </a:endParaRPr>
+          </a:p>
+        </p:txBody>
+      </p:sp>
+      <p:sp>
+        <p:nvSpPr>
+          <p:cNvPr id="3" name="TextBox 2"/>
+          <p:cNvSpPr txBox="1"/>
+          <p:nvPr/>
+        </p:nvSpPr>
+        <p:spPr>
+          <a:xfrm>
+            <a:off x="1941143" y="1358192"/>
+            <a:ext cx="1895391" cy="461665"/>
+          </a:xfrm>
+          <a:prstGeom prst="rect">
+            <a:avLst/>
+          </a:prstGeom>
+          <a:solidFill>
+            <a:schemeClr val="accent6">
+              <a:lumMod val="20000"/>
+              <a:lumOff val="80000"/>
+            </a:schemeClr>
+          </a:solidFill>
+        </p:spPr>
+        <p:txBody>
+          <a:bodyPr wrap="none" rtlCol="0">
+            <a:spAutoFit/>
+          </a:bodyPr>
+          <a:lstStyle/>
+          <a:p>
+            <a:r>
+              <a:rPr lang="en-US" sz="2400" dirty="0" smtClean="0"/>
+              <a:t>package </a:t>
+            </a:r>
+            <a:r>
+              <a:rPr lang="en-US" sz="2400" dirty="0" smtClean="0"/>
+              <a:t>main</a:t>
+            </a:r>
+            <a:endParaRPr lang="en-US" sz="2400" dirty="0"/>
+          </a:p>
+        </p:txBody>
+      </p:sp>
+      <p:sp>
+        <p:nvSpPr>
+          <p:cNvPr id="4" name="Rectangle 3"/>
+          <p:cNvSpPr/>
+          <p:nvPr/>
+        </p:nvSpPr>
+        <p:spPr>
+          <a:xfrm>
+            <a:off x="2241756" y="2233425"/>
+            <a:ext cx="3288890" cy="3156155"/>
+          </a:xfrm>
+          <a:prstGeom prst="rect">
+            <a:avLst/>
+          </a:prstGeom>
+          <a:noFill/>
+          <a:ln w="38100" cmpd="sng">
+            <a:solidFill>
+              <a:schemeClr val="tx1"/>
+            </a:solidFill>
+          </a:ln>
+          <a:effectLst/>
+        </p:spPr>
+        <p:style>
+          <a:lnRef idx="1">
+            <a:schemeClr val="accent1"/>
+          </a:lnRef>
+          <a:fillRef idx="3">
+            <a:schemeClr val="accent1"/>
+          </a:fillRef>
+          <a:effectRef idx="2">
+            <a:schemeClr val="accent1"/>
+          </a:effectRef>
+          <a:fontRef idx="minor">
+            <a:schemeClr val="lt1"/>
+          </a:fontRef>
+        </p:style>
+        <p:txBody>
+          <a:bodyPr wrap="none" rtlCol="0" anchor="ctr"/>
+          <a:lstStyle/>
+          <a:p>
+            <a:pPr algn="ctr"/>
+            <a:endParaRPr lang="en-US" sz="3200" dirty="0" smtClean="0">
+              <a:solidFill>
+                <a:schemeClr val="tx1"/>
+              </a:solidFill>
+            </a:endParaRPr>
+          </a:p>
+        </p:txBody>
+      </p:sp>
+      <p:sp>
+        <p:nvSpPr>
+          <p:cNvPr id="8" name="TextBox 7"/>
+          <p:cNvSpPr txBox="1"/>
+          <p:nvPr/>
+        </p:nvSpPr>
+        <p:spPr>
+          <a:xfrm>
+            <a:off x="2420178" y="1937602"/>
+            <a:ext cx="1259768" cy="461665"/>
+          </a:xfrm>
+          <a:prstGeom prst="rect">
+            <a:avLst/>
+          </a:prstGeom>
+          <a:solidFill>
+            <a:schemeClr val="accent6">
+              <a:lumMod val="20000"/>
+              <a:lumOff val="80000"/>
+            </a:schemeClr>
+          </a:solidFill>
+        </p:spPr>
+        <p:txBody>
+          <a:bodyPr wrap="none" rtlCol="0">
+            <a:spAutoFit/>
+          </a:bodyPr>
+          <a:lstStyle/>
+          <a:p>
+            <a:r>
+              <a:rPr lang="en-US" sz="2400" dirty="0" smtClean="0"/>
+              <a:t>control s</a:t>
+            </a:r>
+            <a:endParaRPr lang="en-US" sz="2400" dirty="0"/>
+          </a:p>
+        </p:txBody>
+      </p:sp>
+      <p:sp>
+        <p:nvSpPr>
+          <p:cNvPr id="14" name="Rectangle 13"/>
+          <p:cNvSpPr/>
+          <p:nvPr/>
+        </p:nvSpPr>
+        <p:spPr>
+          <a:xfrm>
+            <a:off x="1398494" y="1011218"/>
+            <a:ext cx="4905487" cy="4765637"/>
+          </a:xfrm>
+          <a:prstGeom prst="rect">
+            <a:avLst/>
+          </a:prstGeom>
+          <a:noFill/>
+          <a:ln w="38100" cmpd="sng">
+            <a:solidFill>
+              <a:schemeClr val="tx1"/>
+            </a:solidFill>
+          </a:ln>
+          <a:effectLst/>
+        </p:spPr>
+        <p:style>
+          <a:lnRef idx="1">
+            <a:schemeClr val="accent1"/>
+          </a:lnRef>
+          <a:fillRef idx="3">
+            <a:schemeClr val="accent1"/>
+          </a:fillRef>
+          <a:effectRef idx="2">
+            <a:schemeClr val="accent1"/>
+          </a:effectRef>
+          <a:fontRef idx="minor">
+            <a:schemeClr val="lt1"/>
+          </a:fontRef>
+        </p:style>
+        <p:txBody>
+          <a:bodyPr wrap="none" rtlCol="0" anchor="ctr"/>
+          <a:lstStyle/>
+          <a:p>
+            <a:pPr algn="ctr"/>
+            <a:endParaRPr lang="en-US" sz="3200" dirty="0" smtClean="0">
+              <a:solidFill>
+                <a:schemeClr val="tx1"/>
+              </a:solidFill>
+            </a:endParaRPr>
+          </a:p>
+        </p:txBody>
+      </p:sp>
+      <p:sp>
+        <p:nvSpPr>
+          <p:cNvPr id="16" name="TextBox 15"/>
+          <p:cNvSpPr txBox="1"/>
+          <p:nvPr/>
+        </p:nvSpPr>
+        <p:spPr>
+          <a:xfrm>
+            <a:off x="1508728" y="706603"/>
+            <a:ext cx="1192634" cy="461665"/>
+          </a:xfrm>
+          <a:prstGeom prst="rect">
+            <a:avLst/>
+          </a:prstGeom>
+          <a:solidFill>
+            <a:schemeClr val="accent6">
+              <a:lumMod val="20000"/>
+              <a:lumOff val="80000"/>
+            </a:schemeClr>
+          </a:solidFill>
+        </p:spPr>
+        <p:txBody>
+          <a:bodyPr wrap="none" rtlCol="0">
+            <a:spAutoFit/>
+          </a:bodyPr>
+          <a:lstStyle/>
+          <a:p>
+            <a:r>
+              <a:rPr lang="en-US" sz="2400" i="1" dirty="0" err="1" smtClean="0"/>
+              <a:t>toplevel</a:t>
+            </a:r>
+            <a:endParaRPr lang="en-US" sz="2400" i="1" dirty="0"/>
+          </a:p>
+        </p:txBody>
+      </p:sp>
+      <p:sp>
+        <p:nvSpPr>
+          <p:cNvPr id="17" name="Rectangle 16"/>
+          <p:cNvSpPr/>
+          <p:nvPr/>
+        </p:nvSpPr>
+        <p:spPr>
+          <a:xfrm>
+            <a:off x="2455609" y="2578087"/>
+            <a:ext cx="2761850" cy="1133301"/>
+          </a:xfrm>
+          <a:prstGeom prst="rect">
+            <a:avLst/>
+          </a:prstGeom>
+          <a:noFill/>
+          <a:ln w="38100" cmpd="sng">
+            <a:solidFill>
+              <a:schemeClr val="tx1"/>
+            </a:solidFill>
+          </a:ln>
+          <a:effectLst/>
+        </p:spPr>
+        <p:style>
+          <a:lnRef idx="1">
+            <a:schemeClr val="accent1"/>
+          </a:lnRef>
+          <a:fillRef idx="3">
+            <a:schemeClr val="accent1"/>
+          </a:fillRef>
+          <a:effectRef idx="2">
+            <a:schemeClr val="accent1"/>
+          </a:effectRef>
+          <a:fontRef idx="minor">
+            <a:schemeClr val="lt1"/>
+          </a:fontRef>
+        </p:style>
+        <p:txBody>
+          <a:bodyPr wrap="none" rtlCol="0" anchor="ctr"/>
+          <a:lstStyle/>
+          <a:p>
+            <a:pPr algn="ctr"/>
+            <a:endParaRPr lang="en-US" sz="3200" dirty="0" smtClean="0">
+              <a:solidFill>
+                <a:schemeClr val="tx1"/>
+              </a:solidFill>
+            </a:endParaRPr>
+          </a:p>
+        </p:txBody>
+      </p:sp>
+      <p:sp>
+        <p:nvSpPr>
+          <p:cNvPr id="18" name="Rectangle 17"/>
+          <p:cNvSpPr/>
+          <p:nvPr/>
+        </p:nvSpPr>
+        <p:spPr>
+          <a:xfrm>
+            <a:off x="3986382" y="2745726"/>
+            <a:ext cx="1112743" cy="798021"/>
+          </a:xfrm>
+          <a:prstGeom prst="rect">
+            <a:avLst/>
+          </a:prstGeom>
+          <a:noFill/>
+          <a:ln w="38100" cmpd="sng">
+            <a:solidFill>
+              <a:schemeClr val="tx1"/>
+            </a:solidFill>
+          </a:ln>
+          <a:effectLst/>
+        </p:spPr>
+        <p:style>
+          <a:lnRef idx="1">
+            <a:schemeClr val="accent1"/>
+          </a:lnRef>
+          <a:fillRef idx="3">
+            <a:schemeClr val="accent1"/>
+          </a:fillRef>
+          <a:effectRef idx="2">
+            <a:schemeClr val="accent1"/>
+          </a:effectRef>
+          <a:fontRef idx="minor">
+            <a:schemeClr val="lt1"/>
+          </a:fontRef>
+        </p:style>
+        <p:txBody>
+          <a:bodyPr wrap="none" rtlCol="0" anchor="ctr"/>
+          <a:lstStyle/>
+          <a:p>
+            <a:pPr algn="ctr"/>
+            <a:endParaRPr lang="en-US" sz="3200" dirty="0" smtClean="0">
+              <a:solidFill>
+                <a:schemeClr val="tx1"/>
+              </a:solidFill>
+            </a:endParaRPr>
+          </a:p>
+        </p:txBody>
+      </p:sp>
+      <p:sp>
+        <p:nvSpPr>
+          <p:cNvPr id="19" name="TextBox 18"/>
+          <p:cNvSpPr txBox="1"/>
+          <p:nvPr/>
+        </p:nvSpPr>
+        <p:spPr>
+          <a:xfrm>
+            <a:off x="2508557" y="2504592"/>
+            <a:ext cx="1424877" cy="461665"/>
+          </a:xfrm>
+          <a:prstGeom prst="rect">
+            <a:avLst/>
+          </a:prstGeom>
+          <a:solidFill>
+            <a:schemeClr val="accent6">
+              <a:lumMod val="20000"/>
+              <a:lumOff val="80000"/>
+            </a:schemeClr>
+          </a:solidFill>
+        </p:spPr>
+        <p:txBody>
+          <a:bodyPr wrap="none" rtlCol="0">
+            <a:spAutoFit/>
+          </a:bodyPr>
+          <a:lstStyle/>
+          <a:p>
+            <a:r>
+              <a:rPr lang="en-US" sz="2400" dirty="0" smtClean="0"/>
+              <a:t>control c1</a:t>
+            </a:r>
+            <a:endParaRPr lang="en-US" sz="2400" dirty="0"/>
+          </a:p>
+        </p:txBody>
+      </p:sp>
+      <p:sp>
+        <p:nvSpPr>
+          <p:cNvPr id="20" name="TextBox 19"/>
+          <p:cNvSpPr txBox="1"/>
+          <p:nvPr/>
+        </p:nvSpPr>
+        <p:spPr>
+          <a:xfrm>
+            <a:off x="4048323" y="2654301"/>
+            <a:ext cx="988860" cy="461665"/>
+          </a:xfrm>
+          <a:prstGeom prst="rect">
+            <a:avLst/>
+          </a:prstGeom>
+          <a:solidFill>
+            <a:schemeClr val="accent6">
+              <a:lumMod val="20000"/>
+              <a:lumOff val="80000"/>
+            </a:schemeClr>
+          </a:solidFill>
+        </p:spPr>
+        <p:txBody>
+          <a:bodyPr wrap="none" rtlCol="0">
+            <a:spAutoFit/>
+          </a:bodyPr>
+          <a:lstStyle/>
+          <a:p>
+            <a:r>
+              <a:rPr lang="en-US" sz="2400" dirty="0" smtClean="0"/>
+              <a:t>table t</a:t>
+            </a:r>
+            <a:endParaRPr lang="en-US" sz="2400" dirty="0"/>
+          </a:p>
+        </p:txBody>
+      </p:sp>
+      <p:sp>
+        <p:nvSpPr>
+          <p:cNvPr id="21" name="Rectangle 20"/>
+          <p:cNvSpPr/>
+          <p:nvPr/>
+        </p:nvSpPr>
+        <p:spPr>
+          <a:xfrm>
+            <a:off x="2455609" y="3990670"/>
+            <a:ext cx="2761850" cy="1133301"/>
+          </a:xfrm>
+          <a:prstGeom prst="rect">
+            <a:avLst/>
+          </a:prstGeom>
+          <a:noFill/>
+          <a:ln w="38100" cmpd="sng">
+            <a:solidFill>
+              <a:schemeClr val="tx1"/>
+            </a:solidFill>
+          </a:ln>
+          <a:effectLst/>
+        </p:spPr>
+        <p:style>
+          <a:lnRef idx="1">
+            <a:schemeClr val="accent1"/>
+          </a:lnRef>
+          <a:fillRef idx="3">
+            <a:schemeClr val="accent1"/>
+          </a:fillRef>
+          <a:effectRef idx="2">
+            <a:schemeClr val="accent1"/>
+          </a:effectRef>
+          <a:fontRef idx="minor">
+            <a:schemeClr val="lt1"/>
+          </a:fontRef>
+        </p:style>
+        <p:txBody>
+          <a:bodyPr wrap="none" rtlCol="0" anchor="ctr"/>
+          <a:lstStyle/>
+          <a:p>
+            <a:pPr algn="ctr"/>
+            <a:endParaRPr lang="en-US" sz="3200" dirty="0" smtClean="0">
+              <a:solidFill>
+                <a:schemeClr val="tx1"/>
+              </a:solidFill>
+            </a:endParaRPr>
+          </a:p>
+        </p:txBody>
+      </p:sp>
+      <p:sp>
+        <p:nvSpPr>
+          <p:cNvPr id="22" name="Rectangle 21"/>
+          <p:cNvSpPr/>
+          <p:nvPr/>
+        </p:nvSpPr>
+        <p:spPr>
+          <a:xfrm>
+            <a:off x="3986382" y="4158309"/>
+            <a:ext cx="1112743" cy="798021"/>
+          </a:xfrm>
+          <a:prstGeom prst="rect">
+            <a:avLst/>
+          </a:prstGeom>
+          <a:noFill/>
+          <a:ln w="38100" cmpd="sng">
+            <a:solidFill>
+              <a:schemeClr val="tx1"/>
+            </a:solidFill>
+          </a:ln>
+          <a:effectLst/>
+        </p:spPr>
+        <p:style>
+          <a:lnRef idx="1">
+            <a:schemeClr val="accent1"/>
+          </a:lnRef>
+          <a:fillRef idx="3">
+            <a:schemeClr val="accent1"/>
+          </a:fillRef>
+          <a:effectRef idx="2">
+            <a:schemeClr val="accent1"/>
+          </a:effectRef>
+          <a:fontRef idx="minor">
+            <a:schemeClr val="lt1"/>
+          </a:fontRef>
+        </p:style>
+        <p:txBody>
+          <a:bodyPr wrap="none" rtlCol="0" anchor="ctr"/>
+          <a:lstStyle/>
+          <a:p>
+            <a:pPr algn="ctr"/>
+            <a:endParaRPr lang="en-US" sz="3200" dirty="0" smtClean="0">
+              <a:solidFill>
+                <a:schemeClr val="tx1"/>
+              </a:solidFill>
+            </a:endParaRPr>
+          </a:p>
+        </p:txBody>
+      </p:sp>
+      <p:sp>
+        <p:nvSpPr>
+          <p:cNvPr id="23" name="TextBox 22"/>
+          <p:cNvSpPr txBox="1"/>
+          <p:nvPr/>
+        </p:nvSpPr>
+        <p:spPr>
+          <a:xfrm>
+            <a:off x="2530534" y="3862062"/>
+            <a:ext cx="1424877" cy="461665"/>
+          </a:xfrm>
+          <a:prstGeom prst="rect">
+            <a:avLst/>
+          </a:prstGeom>
+          <a:solidFill>
+            <a:schemeClr val="accent6">
+              <a:lumMod val="20000"/>
+              <a:lumOff val="80000"/>
+            </a:schemeClr>
+          </a:solidFill>
+        </p:spPr>
+        <p:txBody>
+          <a:bodyPr wrap="none" rtlCol="0">
+            <a:spAutoFit/>
+          </a:bodyPr>
+          <a:lstStyle/>
+          <a:p>
+            <a:r>
+              <a:rPr lang="en-US" sz="2400" dirty="0" smtClean="0"/>
+              <a:t>control c2</a:t>
+            </a:r>
+            <a:endParaRPr lang="en-US" sz="2400" dirty="0"/>
+          </a:p>
+        </p:txBody>
+      </p:sp>
+      <p:sp>
+        <p:nvSpPr>
+          <p:cNvPr id="24" name="TextBox 23"/>
+          <p:cNvSpPr txBox="1"/>
+          <p:nvPr/>
+        </p:nvSpPr>
+        <p:spPr>
+          <a:xfrm>
+            <a:off x="4048323" y="4078002"/>
+            <a:ext cx="988860" cy="461665"/>
+          </a:xfrm>
+          <a:prstGeom prst="rect">
+            <a:avLst/>
+          </a:prstGeom>
+          <a:solidFill>
+            <a:schemeClr val="accent6">
+              <a:lumMod val="20000"/>
+              <a:lumOff val="80000"/>
+            </a:schemeClr>
+          </a:solidFill>
+        </p:spPr>
+        <p:txBody>
+          <a:bodyPr wrap="none" rtlCol="0">
+            <a:spAutoFit/>
+          </a:bodyPr>
+          <a:lstStyle/>
+          <a:p>
+            <a:r>
+              <a:rPr lang="en-US" sz="2400" dirty="0" smtClean="0"/>
+              <a:t>table t</a:t>
+            </a:r>
+            <a:endParaRPr lang="en-US" sz="2400" dirty="0"/>
+          </a:p>
+        </p:txBody>
+      </p:sp>
+    </p:spTree>
+    <p:extLst>
+      <p:ext uri="{BB962C8B-B14F-4D97-AF65-F5344CB8AC3E}">
+        <p14:creationId xmlns:p14="http://schemas.microsoft.com/office/powerpoint/2010/main" val="1304484956"/>
       </p:ext>
     </p:extLst>
   </p:cSld>

</xml_diff>

<commit_message>
New document versions produced
</commit_message>
<xml_diff>
--- a/v1.2/spec/P4v1.2-spec.pptx
+++ b/v1.2/spec/P4v1.2-spec.pptx
@@ -226,7 +226,7 @@
           <a:p>
             <a:fld id="{DED3B27D-5B62-AC40-B6AC-59B5C583BAA4}" type="datetimeFigureOut">
               <a:rPr lang="en-US" smtClean="0"/>
-              <a:t>4/29/16</a:t>
+              <a:t>5/3/16</a:t>
             </a:fld>
             <a:endParaRPr lang="en-US"/>
           </a:p>
@@ -672,7 +672,7 @@
           <a:p>
             <a:fld id="{E5FA88D9-A900-BE49-8FB1-39E9E0AFC9E6}" type="datetimeFigureOut">
               <a:rPr lang="en-US" smtClean="0"/>
-              <a:t>4/29/16</a:t>
+              <a:t>5/3/16</a:t>
             </a:fld>
             <a:endParaRPr lang="en-US"/>
           </a:p>
@@ -840,7 +840,7 @@
           <a:p>
             <a:fld id="{E5FA88D9-A900-BE49-8FB1-39E9E0AFC9E6}" type="datetimeFigureOut">
               <a:rPr lang="en-US" smtClean="0"/>
-              <a:t>4/29/16</a:t>
+              <a:t>5/3/16</a:t>
             </a:fld>
             <a:endParaRPr lang="en-US"/>
           </a:p>
@@ -1018,7 +1018,7 @@
           <a:p>
             <a:fld id="{E5FA88D9-A900-BE49-8FB1-39E9E0AFC9E6}" type="datetimeFigureOut">
               <a:rPr lang="en-US" smtClean="0"/>
-              <a:t>4/29/16</a:t>
+              <a:t>5/3/16</a:t>
             </a:fld>
             <a:endParaRPr lang="en-US"/>
           </a:p>
@@ -1186,7 +1186,7 @@
           <a:p>
             <a:fld id="{E5FA88D9-A900-BE49-8FB1-39E9E0AFC9E6}" type="datetimeFigureOut">
               <a:rPr lang="en-US" smtClean="0"/>
-              <a:t>4/29/16</a:t>
+              <a:t>5/3/16</a:t>
             </a:fld>
             <a:endParaRPr lang="en-US"/>
           </a:p>
@@ -1431,7 +1431,7 @@
           <a:p>
             <a:fld id="{E5FA88D9-A900-BE49-8FB1-39E9E0AFC9E6}" type="datetimeFigureOut">
               <a:rPr lang="en-US" smtClean="0"/>
-              <a:t>4/29/16</a:t>
+              <a:t>5/3/16</a:t>
             </a:fld>
             <a:endParaRPr lang="en-US"/>
           </a:p>
@@ -1716,7 +1716,7 @@
           <a:p>
             <a:fld id="{E5FA88D9-A900-BE49-8FB1-39E9E0AFC9E6}" type="datetimeFigureOut">
               <a:rPr lang="en-US" smtClean="0"/>
-              <a:t>4/29/16</a:t>
+              <a:t>5/3/16</a:t>
             </a:fld>
             <a:endParaRPr lang="en-US"/>
           </a:p>
@@ -2135,7 +2135,7 @@
           <a:p>
             <a:fld id="{E5FA88D9-A900-BE49-8FB1-39E9E0AFC9E6}" type="datetimeFigureOut">
               <a:rPr lang="en-US" smtClean="0"/>
-              <a:t>4/29/16</a:t>
+              <a:t>5/3/16</a:t>
             </a:fld>
             <a:endParaRPr lang="en-US"/>
           </a:p>
@@ -2252,7 +2252,7 @@
           <a:p>
             <a:fld id="{E5FA88D9-A900-BE49-8FB1-39E9E0AFC9E6}" type="datetimeFigureOut">
               <a:rPr lang="en-US" smtClean="0"/>
-              <a:t>4/29/16</a:t>
+              <a:t>5/3/16</a:t>
             </a:fld>
             <a:endParaRPr lang="en-US"/>
           </a:p>
@@ -2347,7 +2347,7 @@
           <a:p>
             <a:fld id="{E5FA88D9-A900-BE49-8FB1-39E9E0AFC9E6}" type="datetimeFigureOut">
               <a:rPr lang="en-US" smtClean="0"/>
-              <a:t>4/29/16</a:t>
+              <a:t>5/3/16</a:t>
             </a:fld>
             <a:endParaRPr lang="en-US"/>
           </a:p>
@@ -2622,7 +2622,7 @@
           <a:p>
             <a:fld id="{E5FA88D9-A900-BE49-8FB1-39E9E0AFC9E6}" type="datetimeFigureOut">
               <a:rPr lang="en-US" smtClean="0"/>
-              <a:t>4/29/16</a:t>
+              <a:t>5/3/16</a:t>
             </a:fld>
             <a:endParaRPr lang="en-US"/>
           </a:p>
@@ -2874,7 +2874,7 @@
           <a:p>
             <a:fld id="{E5FA88D9-A900-BE49-8FB1-39E9E0AFC9E6}" type="datetimeFigureOut">
               <a:rPr lang="en-US" smtClean="0"/>
-              <a:t>4/29/16</a:t>
+              <a:t>5/3/16</a:t>
             </a:fld>
             <a:endParaRPr lang="en-US"/>
           </a:p>
@@ -3085,7 +3085,7 @@
           <a:p>
             <a:fld id="{E5FA88D9-A900-BE49-8FB1-39E9E0AFC9E6}" type="datetimeFigureOut">
               <a:rPr lang="en-US" smtClean="0"/>
-              <a:t>4/29/16</a:t>
+              <a:t>5/3/16</a:t>
             </a:fld>
             <a:endParaRPr lang="en-US"/>
           </a:p>
@@ -7012,7 +7012,7 @@
           <p:nvPr>
             <p:extLst>
               <p:ext uri="{D42A27DB-BD31-4B8C-83A1-F6EECF244321}">
-                <p14:modId xmlns:p14="http://schemas.microsoft.com/office/powerpoint/2010/main" val="186698161"/>
+                <p14:modId xmlns:p14="http://schemas.microsoft.com/office/powerpoint/2010/main" val="481937990"/>
               </p:ext>
             </p:extLst>
           </p:nvPr>
@@ -7031,14 +7031,14 @@
                 <a:gridCol w="1207821">
                   <a:extLst>
                     <a:ext uri="{9D8B030D-6E8A-4147-A177-3AD203B41FA5}">
-                      <a16:colId xmlns="" xmlns:a16="http://schemas.microsoft.com/office/drawing/2014/main" val="20000"/>
+                      <a16:colId xmlns:a16="http://schemas.microsoft.com/office/drawing/2014/main" xmlns="" val="20000"/>
                     </a:ext>
                   </a:extLst>
                 </a:gridCol>
                 <a:gridCol w="1233947">
                   <a:extLst>
                     <a:ext uri="{9D8B030D-6E8A-4147-A177-3AD203B41FA5}">
-                      <a16:colId xmlns="" xmlns:a16="http://schemas.microsoft.com/office/drawing/2014/main" val="20001"/>
+                      <a16:colId xmlns:a16="http://schemas.microsoft.com/office/drawing/2014/main" xmlns="" val="20001"/>
                     </a:ext>
                   </a:extLst>
                 </a:gridCol>
@@ -7072,7 +7072,7 @@
                 </a:tc>
                 <a:extLst>
                   <a:ext uri="{0D108BD9-81ED-4DB2-BD59-A6C34878D82A}">
-                    <a16:rowId xmlns="" xmlns:a16="http://schemas.microsoft.com/office/drawing/2014/main" val="10000"/>
+                    <a16:rowId xmlns:a16="http://schemas.microsoft.com/office/drawing/2014/main" xmlns="" val="10000"/>
                   </a:ext>
                 </a:extLst>
               </a:tr>
@@ -7099,7 +7099,7 @@
                 </a:tc>
                 <a:extLst>
                   <a:ext uri="{0D108BD9-81ED-4DB2-BD59-A6C34878D82A}">
-                    <a16:rowId xmlns="" xmlns:a16="http://schemas.microsoft.com/office/drawing/2014/main" val="10001"/>
+                    <a16:rowId xmlns:a16="http://schemas.microsoft.com/office/drawing/2014/main" xmlns="" val="10001"/>
                   </a:ext>
                 </a:extLst>
               </a:tr>
@@ -7126,7 +7126,7 @@
                 </a:tc>
                 <a:extLst>
                   <a:ext uri="{0D108BD9-81ED-4DB2-BD59-A6C34878D82A}">
-                    <a16:rowId xmlns="" xmlns:a16="http://schemas.microsoft.com/office/drawing/2014/main" val="10002"/>
+                    <a16:rowId xmlns:a16="http://schemas.microsoft.com/office/drawing/2014/main" xmlns="" val="10002"/>
                   </a:ext>
                 </a:extLst>
               </a:tr>
@@ -7148,15 +7148,11 @@
                     <a:p>
                       <a:r>
                         <a:rPr lang="en-US" sz="1600" dirty="0" smtClean="0"/>
-                        <a:t>code &amp;</a:t>
-                      </a:r>
-                      <a:r>
-                        <a:rPr lang="en-US" sz="1600" baseline="0" dirty="0" smtClean="0"/>
-                        <a:t> </a:t>
+                        <a:t>action code </a:t>
                       </a:r>
                       <a:r>
                         <a:rPr lang="en-US" sz="1600" dirty="0" smtClean="0"/>
-                        <a:t>action</a:t>
+                        <a:t>&amp;</a:t>
                       </a:r>
                       <a:r>
                         <a:rPr lang="en-US" sz="1600" baseline="0" dirty="0" smtClean="0"/>
@@ -7173,7 +7169,7 @@
                 </a:tc>
                 <a:extLst>
                   <a:ext uri="{0D108BD9-81ED-4DB2-BD59-A6C34878D82A}">
-                    <a16:rowId xmlns="" xmlns:a16="http://schemas.microsoft.com/office/drawing/2014/main" val="10003"/>
+                    <a16:rowId xmlns:a16="http://schemas.microsoft.com/office/drawing/2014/main" xmlns="" val="10003"/>
                   </a:ext>
                 </a:extLst>
               </a:tr>
@@ -7200,7 +7196,7 @@
                 </a:tc>
                 <a:extLst>
                   <a:ext uri="{0D108BD9-81ED-4DB2-BD59-A6C34878D82A}">
-                    <a16:rowId xmlns="" xmlns:a16="http://schemas.microsoft.com/office/drawing/2014/main" val="10004"/>
+                    <a16:rowId xmlns:a16="http://schemas.microsoft.com/office/drawing/2014/main" xmlns="" val="10004"/>
                   </a:ext>
                 </a:extLst>
               </a:tr>
@@ -7227,7 +7223,7 @@
                 </a:tc>
                 <a:extLst>
                   <a:ext uri="{0D108BD9-81ED-4DB2-BD59-A6C34878D82A}">
-                    <a16:rowId xmlns="" xmlns:a16="http://schemas.microsoft.com/office/drawing/2014/main" val="10005"/>
+                    <a16:rowId xmlns:a16="http://schemas.microsoft.com/office/drawing/2014/main" xmlns="" val="10005"/>
                   </a:ext>
                 </a:extLst>
               </a:tr>
@@ -7590,8 +7586,8 @@
         </p:nvSpPr>
         <p:spPr>
           <a:xfrm>
-            <a:off x="-105831" y="4297887"/>
-            <a:ext cx="998735" cy="830997"/>
+            <a:off x="-135912" y="4342953"/>
+            <a:ext cx="1145762" cy="646331"/>
           </a:xfrm>
           <a:prstGeom prst="rect">
             <a:avLst/>
@@ -7606,17 +7602,17 @@
           <a:p>
             <a:pPr algn="ctr"/>
             <a:r>
-              <a:rPr lang="en-US" sz="2400" smtClean="0"/>
-              <a:t>Packet</a:t>
-            </a:r>
-            <a:br>
-              <a:rPr lang="en-US" sz="2400" smtClean="0"/>
-            </a:br>
-            <a:r>
-              <a:rPr lang="en-US" sz="2400" smtClean="0"/>
-              <a:t>Data</a:t>
-            </a:r>
-            <a:endParaRPr lang="en-US" sz="2400" dirty="0"/>
+              <a:rPr lang="en-US" dirty="0" smtClean="0"/>
+              <a:t>headers &amp;</a:t>
+            </a:r>
+          </a:p>
+          <a:p>
+            <a:pPr algn="ctr"/>
+            <a:r>
+              <a:rPr lang="en-US" dirty="0" smtClean="0"/>
+              <a:t>metadata</a:t>
+            </a:r>
+            <a:endParaRPr lang="en-US" dirty="0"/>
           </a:p>
         </p:txBody>
       </p:sp>
@@ -7707,44 +7703,6 @@
       </p:sp>
       <p:sp>
         <p:nvSpPr>
-          <p:cNvPr id="20" name="TextBox 19"/>
-          <p:cNvSpPr txBox="1"/>
-          <p:nvPr/>
-        </p:nvSpPr>
-        <p:spPr>
-          <a:xfrm>
-            <a:off x="8221937" y="4297887"/>
-            <a:ext cx="998735" cy="830997"/>
-          </a:xfrm>
-          <a:prstGeom prst="rect">
-            <a:avLst/>
-          </a:prstGeom>
-          <a:noFill/>
-        </p:spPr>
-        <p:txBody>
-          <a:bodyPr wrap="none" rtlCol="0">
-            <a:spAutoFit/>
-          </a:bodyPr>
-          <a:lstStyle/>
-          <a:p>
-            <a:pPr algn="ctr"/>
-            <a:r>
-              <a:rPr lang="en-US" sz="2400" dirty="0" smtClean="0"/>
-              <a:t>Packet</a:t>
-            </a:r>
-            <a:br>
-              <a:rPr lang="en-US" sz="2400" dirty="0" smtClean="0"/>
-            </a:br>
-            <a:r>
-              <a:rPr lang="en-US" sz="2400" dirty="0" smtClean="0"/>
-              <a:t>Data</a:t>
-            </a:r>
-            <a:endParaRPr lang="en-US" sz="2400" dirty="0"/>
-          </a:p>
-        </p:txBody>
-      </p:sp>
-      <p:sp>
-        <p:nvSpPr>
           <p:cNvPr id="21" name="Rounded Rectangle 20"/>
           <p:cNvSpPr/>
           <p:nvPr/>
@@ -7952,12 +7910,27 @@
           <a:p>
             <a:pPr algn="ctr"/>
             <a:r>
-              <a:rPr lang="en-US" sz="3200">
+              <a:rPr lang="en-US" sz="3200" dirty="0" smtClean="0">
                 <a:solidFill>
                   <a:schemeClr val="tx1"/>
                 </a:solidFill>
               </a:rPr>
-              <a:t>Data</a:t>
+              <a:t>action</a:t>
+            </a:r>
+            <a:br>
+              <a:rPr lang="en-US" sz="3200" dirty="0" smtClean="0">
+                <a:solidFill>
+                  <a:schemeClr val="tx1"/>
+                </a:solidFill>
+              </a:rPr>
+            </a:br>
+            <a:r>
+              <a:rPr lang="en-US" sz="3200" dirty="0" smtClean="0">
+                <a:solidFill>
+                  <a:schemeClr val="tx1"/>
+                </a:solidFill>
+              </a:rPr>
+              <a:t>data</a:t>
             </a:r>
             <a:endParaRPr lang="en-US" sz="3200" dirty="0">
               <a:solidFill>
@@ -7975,8 +7948,8 @@
         </p:nvSpPr>
         <p:spPr>
           <a:xfrm>
-            <a:off x="6650645" y="814456"/>
-            <a:ext cx="1039668" cy="584776"/>
+            <a:off x="6610364" y="836924"/>
+            <a:ext cx="1220206" cy="1077218"/>
           </a:xfrm>
           <a:prstGeom prst="rect">
             <a:avLst/>
@@ -7990,9 +7963,17 @@
           <a:lstStyle/>
           <a:p>
             <a:r>
-              <a:rPr lang="en-US" sz="3200" dirty="0"/>
-              <a:t>Code</a:t>
-            </a:r>
+              <a:rPr lang="en-US" sz="3200" dirty="0" smtClean="0"/>
+              <a:t>action</a:t>
+            </a:r>
+          </a:p>
+          <a:p>
+            <a:pPr algn="ctr"/>
+            <a:r>
+              <a:rPr lang="en-US" sz="3200" dirty="0" smtClean="0"/>
+              <a:t>code</a:t>
+            </a:r>
+            <a:endParaRPr lang="en-US" sz="3200" dirty="0"/>
           </a:p>
         </p:txBody>
       </p:sp>
@@ -8727,6 +8708,44 @@
               <a:rPr lang="en-US" sz="3200" dirty="0"/>
               <a:t>Data</a:t>
             </a:r>
+          </a:p>
+        </p:txBody>
+      </p:sp>
+      <p:sp>
+        <p:nvSpPr>
+          <p:cNvPr id="37" name="TextBox 36"/>
+          <p:cNvSpPr txBox="1"/>
+          <p:nvPr/>
+        </p:nvSpPr>
+        <p:spPr>
+          <a:xfrm>
+            <a:off x="8047776" y="4342953"/>
+            <a:ext cx="1145762" cy="646331"/>
+          </a:xfrm>
+          <a:prstGeom prst="rect">
+            <a:avLst/>
+          </a:prstGeom>
+          <a:noFill/>
+        </p:spPr>
+        <p:txBody>
+          <a:bodyPr wrap="none" rtlCol="0">
+            <a:spAutoFit/>
+          </a:bodyPr>
+          <a:lstStyle/>
+          <a:p>
+            <a:pPr algn="ctr"/>
+            <a:r>
+              <a:rPr lang="en-US" dirty="0" smtClean="0"/>
+              <a:t>headers &amp;</a:t>
+            </a:r>
+          </a:p>
+          <a:p>
+            <a:pPr algn="ctr"/>
+            <a:r>
+              <a:rPr lang="en-US" dirty="0" smtClean="0"/>
+              <a:t>metadata</a:t>
+            </a:r>
+            <a:endParaRPr lang="en-US" dirty="0"/>
           </a:p>
         </p:txBody>
       </p:sp>
@@ -10530,14 +10549,67 @@
       </p:sp>
       <p:sp>
         <p:nvSpPr>
-          <p:cNvPr id="31" name="TextBox 30"/>
+          <p:cNvPr id="18" name="Rectangle 17"/>
+          <p:cNvSpPr/>
+          <p:nvPr/>
+        </p:nvSpPr>
+        <p:spPr>
+          <a:xfrm>
+            <a:off x="1617717" y="4021068"/>
+            <a:ext cx="560524" cy="901038"/>
+          </a:xfrm>
+          <a:prstGeom prst="rect">
+            <a:avLst/>
+          </a:prstGeom>
+          <a:solidFill>
+            <a:schemeClr val="bg1">
+              <a:lumMod val="75000"/>
+            </a:schemeClr>
+          </a:solidFill>
+          <a:ln w="38100" cmpd="sng">
+            <a:solidFill>
+              <a:schemeClr val="tx1"/>
+            </a:solidFill>
+          </a:ln>
+          <a:effectLst/>
+        </p:spPr>
+        <p:style>
+          <a:lnRef idx="1">
+            <a:schemeClr val="accent1"/>
+          </a:lnRef>
+          <a:fillRef idx="3">
+            <a:schemeClr val="accent1"/>
+          </a:fillRef>
+          <a:effectRef idx="2">
+            <a:schemeClr val="accent1"/>
+          </a:effectRef>
+          <a:fontRef idx="minor">
+            <a:schemeClr val="lt1"/>
+          </a:fontRef>
+        </p:style>
+        <p:txBody>
+          <a:bodyPr wrap="none" rtlCol="0" anchor="ctr"/>
+          <a:lstStyle/>
+          <a:p>
+            <a:pPr algn="ctr"/>
+            <a:endParaRPr lang="en-US" sz="3200" dirty="0">
+              <a:solidFill>
+                <a:schemeClr val="tx1"/>
+              </a:solidFill>
+            </a:endParaRPr>
+          </a:p>
+        </p:txBody>
+      </p:sp>
+      <p:sp>
+        <p:nvSpPr>
+          <p:cNvPr id="33" name="TextBox 32"/>
           <p:cNvSpPr txBox="1"/>
           <p:nvPr/>
         </p:nvSpPr>
         <p:spPr>
           <a:xfrm>
-            <a:off x="1547467" y="1674169"/>
-            <a:ext cx="659155" cy="369332"/>
+            <a:off x="1747149" y="4950283"/>
+            <a:ext cx="301660" cy="369332"/>
           </a:xfrm>
           <a:prstGeom prst="rect">
             <a:avLst/>
@@ -10552,21 +10624,74 @@
           <a:p>
             <a:r>
               <a:rPr lang="en-US" dirty="0"/>
-              <a:t>front</a:t>
-            </a:r>
-          </a:p>
-        </p:txBody>
-      </p:sp>
-      <p:sp>
-        <p:nvSpPr>
-          <p:cNvPr id="32" name="TextBox 31"/>
+              <a:t>0</a:t>
+            </a:r>
+          </a:p>
+        </p:txBody>
+      </p:sp>
+      <p:sp>
+        <p:nvSpPr>
+          <p:cNvPr id="34" name="Rectangle 33"/>
+          <p:cNvSpPr/>
+          <p:nvPr/>
+        </p:nvSpPr>
+        <p:spPr>
+          <a:xfrm>
+            <a:off x="2178241" y="4021068"/>
+            <a:ext cx="560524" cy="901038"/>
+          </a:xfrm>
+          <a:prstGeom prst="rect">
+            <a:avLst/>
+          </a:prstGeom>
+          <a:solidFill>
+            <a:schemeClr val="bg1">
+              <a:lumMod val="75000"/>
+            </a:schemeClr>
+          </a:solidFill>
+          <a:ln w="38100" cmpd="sng">
+            <a:solidFill>
+              <a:schemeClr val="tx1"/>
+            </a:solidFill>
+          </a:ln>
+          <a:effectLst/>
+        </p:spPr>
+        <p:style>
+          <a:lnRef idx="1">
+            <a:schemeClr val="accent1"/>
+          </a:lnRef>
+          <a:fillRef idx="3">
+            <a:schemeClr val="accent1"/>
+          </a:fillRef>
+          <a:effectRef idx="2">
+            <a:schemeClr val="accent1"/>
+          </a:effectRef>
+          <a:fontRef idx="minor">
+            <a:schemeClr val="lt1"/>
+          </a:fontRef>
+        </p:style>
+        <p:txBody>
+          <a:bodyPr wrap="none" rtlCol="0" anchor="ctr"/>
+          <a:lstStyle/>
+          <a:p>
+            <a:pPr algn="ctr"/>
+            <a:endParaRPr lang="en-US" sz="3200" dirty="0">
+              <a:solidFill>
+                <a:schemeClr val="tx1"/>
+              </a:solidFill>
+            </a:endParaRPr>
+          </a:p>
+        </p:txBody>
+      </p:sp>
+      <p:sp>
+        <p:nvSpPr>
+          <p:cNvPr id="35" name="TextBox 34"/>
           <p:cNvSpPr txBox="1"/>
           <p:nvPr/>
         </p:nvSpPr>
         <p:spPr>
           <a:xfrm>
-            <a:off x="4419600" y="1676400"/>
-            <a:ext cx="620683" cy="369332"/>
+            <a:off x="2307673" y="4950283"/>
+            <a:ext cx="301660" cy="369332"/>
           </a:xfrm>
           <a:prstGeom prst="rect">
             <a:avLst/>
@@ -10581,8 +10706,444 @@
           <a:p>
             <a:r>
               <a:rPr lang="en-US" dirty="0"/>
-              <a:t>back</a:t>
-            </a:r>
+              <a:t>1</a:t>
+            </a:r>
+          </a:p>
+        </p:txBody>
+      </p:sp>
+      <p:sp>
+        <p:nvSpPr>
+          <p:cNvPr id="36" name="Rectangle 35"/>
+          <p:cNvSpPr/>
+          <p:nvPr/>
+        </p:nvSpPr>
+        <p:spPr>
+          <a:xfrm>
+            <a:off x="2738765" y="4021068"/>
+            <a:ext cx="560524" cy="901038"/>
+          </a:xfrm>
+          <a:prstGeom prst="rect">
+            <a:avLst/>
+          </a:prstGeom>
+          <a:solidFill>
+            <a:schemeClr val="bg1"/>
+          </a:solidFill>
+          <a:ln w="38100" cmpd="sng">
+            <a:solidFill>
+              <a:schemeClr val="tx1"/>
+            </a:solidFill>
+          </a:ln>
+          <a:effectLst/>
+        </p:spPr>
+        <p:style>
+          <a:lnRef idx="1">
+            <a:schemeClr val="accent1"/>
+          </a:lnRef>
+          <a:fillRef idx="3">
+            <a:schemeClr val="accent1"/>
+          </a:fillRef>
+          <a:effectRef idx="2">
+            <a:schemeClr val="accent1"/>
+          </a:effectRef>
+          <a:fontRef idx="minor">
+            <a:schemeClr val="lt1"/>
+          </a:fontRef>
+        </p:style>
+        <p:txBody>
+          <a:bodyPr wrap="none" rtlCol="0" anchor="ctr"/>
+          <a:lstStyle/>
+          <a:p>
+            <a:pPr algn="ctr"/>
+            <a:endParaRPr lang="en-US" sz="3200" dirty="0">
+              <a:solidFill>
+                <a:schemeClr val="tx1"/>
+              </a:solidFill>
+            </a:endParaRPr>
+          </a:p>
+        </p:txBody>
+      </p:sp>
+      <p:sp>
+        <p:nvSpPr>
+          <p:cNvPr id="37" name="TextBox 36"/>
+          <p:cNvSpPr txBox="1"/>
+          <p:nvPr/>
+        </p:nvSpPr>
+        <p:spPr>
+          <a:xfrm>
+            <a:off x="2868197" y="4950283"/>
+            <a:ext cx="301660" cy="369332"/>
+          </a:xfrm>
+          <a:prstGeom prst="rect">
+            <a:avLst/>
+          </a:prstGeom>
+          <a:noFill/>
+        </p:spPr>
+        <p:txBody>
+          <a:bodyPr wrap="none" rtlCol="0">
+            <a:spAutoFit/>
+          </a:bodyPr>
+          <a:lstStyle/>
+          <a:p>
+            <a:r>
+              <a:rPr lang="en-US" dirty="0"/>
+              <a:t>2</a:t>
+            </a:r>
+          </a:p>
+        </p:txBody>
+      </p:sp>
+      <p:sp>
+        <p:nvSpPr>
+          <p:cNvPr id="38" name="Rectangle 37"/>
+          <p:cNvSpPr/>
+          <p:nvPr/>
+        </p:nvSpPr>
+        <p:spPr>
+          <a:xfrm>
+            <a:off x="3299289" y="4021068"/>
+            <a:ext cx="560524" cy="901038"/>
+          </a:xfrm>
+          <a:prstGeom prst="rect">
+            <a:avLst/>
+          </a:prstGeom>
+          <a:solidFill>
+            <a:schemeClr val="bg1">
+              <a:lumMod val="75000"/>
+            </a:schemeClr>
+          </a:solidFill>
+          <a:ln w="38100" cmpd="sng">
+            <a:solidFill>
+              <a:schemeClr val="tx1"/>
+            </a:solidFill>
+          </a:ln>
+          <a:effectLst/>
+        </p:spPr>
+        <p:style>
+          <a:lnRef idx="1">
+            <a:schemeClr val="accent1"/>
+          </a:lnRef>
+          <a:fillRef idx="3">
+            <a:schemeClr val="accent1"/>
+          </a:fillRef>
+          <a:effectRef idx="2">
+            <a:schemeClr val="accent1"/>
+          </a:effectRef>
+          <a:fontRef idx="minor">
+            <a:schemeClr val="lt1"/>
+          </a:fontRef>
+        </p:style>
+        <p:txBody>
+          <a:bodyPr wrap="none" rtlCol="0" anchor="ctr"/>
+          <a:lstStyle/>
+          <a:p>
+            <a:pPr algn="ctr"/>
+            <a:endParaRPr lang="en-US" sz="3200" dirty="0">
+              <a:solidFill>
+                <a:schemeClr val="tx1"/>
+              </a:solidFill>
+            </a:endParaRPr>
+          </a:p>
+        </p:txBody>
+      </p:sp>
+      <p:sp>
+        <p:nvSpPr>
+          <p:cNvPr id="39" name="TextBox 38"/>
+          <p:cNvSpPr txBox="1"/>
+          <p:nvPr/>
+        </p:nvSpPr>
+        <p:spPr>
+          <a:xfrm>
+            <a:off x="3428721" y="4950283"/>
+            <a:ext cx="301660" cy="369332"/>
+          </a:xfrm>
+          <a:prstGeom prst="rect">
+            <a:avLst/>
+          </a:prstGeom>
+          <a:noFill/>
+        </p:spPr>
+        <p:txBody>
+          <a:bodyPr wrap="none" rtlCol="0">
+            <a:spAutoFit/>
+          </a:bodyPr>
+          <a:lstStyle/>
+          <a:p>
+            <a:r>
+              <a:rPr lang="en-US" dirty="0"/>
+              <a:t>3</a:t>
+            </a:r>
+          </a:p>
+        </p:txBody>
+      </p:sp>
+      <p:sp>
+        <p:nvSpPr>
+          <p:cNvPr id="40" name="Rectangle 39"/>
+          <p:cNvSpPr/>
+          <p:nvPr/>
+        </p:nvSpPr>
+        <p:spPr>
+          <a:xfrm>
+            <a:off x="3859813" y="4021068"/>
+            <a:ext cx="560524" cy="901038"/>
+          </a:xfrm>
+          <a:prstGeom prst="rect">
+            <a:avLst/>
+          </a:prstGeom>
+          <a:noFill/>
+          <a:ln w="38100" cmpd="sng">
+            <a:solidFill>
+              <a:schemeClr val="tx1"/>
+            </a:solidFill>
+          </a:ln>
+          <a:effectLst/>
+        </p:spPr>
+        <p:style>
+          <a:lnRef idx="1">
+            <a:schemeClr val="accent1"/>
+          </a:lnRef>
+          <a:fillRef idx="3">
+            <a:schemeClr val="accent1"/>
+          </a:fillRef>
+          <a:effectRef idx="2">
+            <a:schemeClr val="accent1"/>
+          </a:effectRef>
+          <a:fontRef idx="minor">
+            <a:schemeClr val="lt1"/>
+          </a:fontRef>
+        </p:style>
+        <p:txBody>
+          <a:bodyPr wrap="none" rtlCol="0" anchor="ctr"/>
+          <a:lstStyle/>
+          <a:p>
+            <a:pPr algn="ctr"/>
+            <a:endParaRPr lang="en-US" sz="3200" dirty="0">
+              <a:solidFill>
+                <a:schemeClr val="tx1"/>
+              </a:solidFill>
+            </a:endParaRPr>
+          </a:p>
+        </p:txBody>
+      </p:sp>
+      <p:sp>
+        <p:nvSpPr>
+          <p:cNvPr id="41" name="TextBox 40"/>
+          <p:cNvSpPr txBox="1"/>
+          <p:nvPr/>
+        </p:nvSpPr>
+        <p:spPr>
+          <a:xfrm>
+            <a:off x="3989245" y="4950283"/>
+            <a:ext cx="301660" cy="369332"/>
+          </a:xfrm>
+          <a:prstGeom prst="rect">
+            <a:avLst/>
+          </a:prstGeom>
+          <a:noFill/>
+        </p:spPr>
+        <p:txBody>
+          <a:bodyPr wrap="none" rtlCol="0">
+            <a:spAutoFit/>
+          </a:bodyPr>
+          <a:lstStyle/>
+          <a:p>
+            <a:r>
+              <a:rPr lang="en-US" dirty="0"/>
+              <a:t>4</a:t>
+            </a:r>
+          </a:p>
+        </p:txBody>
+      </p:sp>
+      <p:sp>
+        <p:nvSpPr>
+          <p:cNvPr id="42" name="Rectangle 41"/>
+          <p:cNvSpPr/>
+          <p:nvPr/>
+        </p:nvSpPr>
+        <p:spPr>
+          <a:xfrm>
+            <a:off x="4420337" y="4021068"/>
+            <a:ext cx="560524" cy="901038"/>
+          </a:xfrm>
+          <a:prstGeom prst="rect">
+            <a:avLst/>
+          </a:prstGeom>
+          <a:noFill/>
+          <a:ln w="38100" cmpd="sng">
+            <a:solidFill>
+              <a:schemeClr val="tx1"/>
+            </a:solidFill>
+          </a:ln>
+          <a:effectLst/>
+        </p:spPr>
+        <p:style>
+          <a:lnRef idx="1">
+            <a:schemeClr val="accent1"/>
+          </a:lnRef>
+          <a:fillRef idx="3">
+            <a:schemeClr val="accent1"/>
+          </a:fillRef>
+          <a:effectRef idx="2">
+            <a:schemeClr val="accent1"/>
+          </a:effectRef>
+          <a:fontRef idx="minor">
+            <a:schemeClr val="lt1"/>
+          </a:fontRef>
+        </p:style>
+        <p:txBody>
+          <a:bodyPr wrap="none" rtlCol="0" anchor="ctr"/>
+          <a:lstStyle/>
+          <a:p>
+            <a:pPr algn="ctr"/>
+            <a:endParaRPr lang="en-US" sz="3200" dirty="0">
+              <a:solidFill>
+                <a:schemeClr val="tx1"/>
+              </a:solidFill>
+            </a:endParaRPr>
+          </a:p>
+        </p:txBody>
+      </p:sp>
+      <p:sp>
+        <p:nvSpPr>
+          <p:cNvPr id="43" name="TextBox 42"/>
+          <p:cNvSpPr txBox="1"/>
+          <p:nvPr/>
+        </p:nvSpPr>
+        <p:spPr>
+          <a:xfrm>
+            <a:off x="4549769" y="4950283"/>
+            <a:ext cx="301660" cy="369332"/>
+          </a:xfrm>
+          <a:prstGeom prst="rect">
+            <a:avLst/>
+          </a:prstGeom>
+          <a:noFill/>
+        </p:spPr>
+        <p:txBody>
+          <a:bodyPr wrap="none" rtlCol="0">
+            <a:spAutoFit/>
+          </a:bodyPr>
+          <a:lstStyle/>
+          <a:p>
+            <a:r>
+              <a:rPr lang="en-US" dirty="0"/>
+              <a:t>5</a:t>
+            </a:r>
+          </a:p>
+        </p:txBody>
+      </p:sp>
+      <p:sp>
+        <p:nvSpPr>
+          <p:cNvPr id="44" name="TextBox 43"/>
+          <p:cNvSpPr txBox="1"/>
+          <p:nvPr/>
+        </p:nvSpPr>
+        <p:spPr>
+          <a:xfrm>
+            <a:off x="2719982" y="3651736"/>
+            <a:ext cx="598090" cy="369332"/>
+          </a:xfrm>
+          <a:prstGeom prst="rect">
+            <a:avLst/>
+          </a:prstGeom>
+          <a:noFill/>
+        </p:spPr>
+        <p:txBody>
+          <a:bodyPr wrap="none" rtlCol="0">
+            <a:spAutoFit/>
+          </a:bodyPr>
+          <a:lstStyle/>
+          <a:p>
+            <a:r>
+              <a:rPr lang="en-US" dirty="0"/>
+              <a:t>next</a:t>
+            </a:r>
+          </a:p>
+        </p:txBody>
+      </p:sp>
+      <p:sp>
+        <p:nvSpPr>
+          <p:cNvPr id="45" name="TextBox 44"/>
+          <p:cNvSpPr txBox="1"/>
+          <p:nvPr/>
+        </p:nvSpPr>
+        <p:spPr>
+          <a:xfrm>
+            <a:off x="3313477" y="3651736"/>
+            <a:ext cx="518091" cy="369332"/>
+          </a:xfrm>
+          <a:prstGeom prst="rect">
+            <a:avLst/>
+          </a:prstGeom>
+          <a:noFill/>
+        </p:spPr>
+        <p:txBody>
+          <a:bodyPr wrap="none" rtlCol="0">
+            <a:spAutoFit/>
+          </a:bodyPr>
+          <a:lstStyle/>
+          <a:p>
+            <a:r>
+              <a:rPr lang="en-US" dirty="0"/>
+              <a:t>last</a:t>
+            </a:r>
+          </a:p>
+        </p:txBody>
+      </p:sp>
+      <p:sp>
+        <p:nvSpPr>
+          <p:cNvPr id="2" name="TextBox 1"/>
+          <p:cNvSpPr txBox="1"/>
+          <p:nvPr/>
+        </p:nvSpPr>
+        <p:spPr>
+          <a:xfrm rot="16200000">
+            <a:off x="1574169" y="2294963"/>
+            <a:ext cx="623889" cy="369332"/>
+          </a:xfrm>
+          <a:prstGeom prst="rect">
+            <a:avLst/>
+          </a:prstGeom>
+          <a:noFill/>
+        </p:spPr>
+        <p:txBody>
+          <a:bodyPr wrap="none" rtlCol="0">
+            <a:spAutoFit/>
+          </a:bodyPr>
+          <a:lstStyle/>
+          <a:p>
+            <a:r>
+              <a:rPr lang="en-US" smtClean="0"/>
+              <a:t>valid</a:t>
+            </a:r>
+            <a:endParaRPr lang="en-US"/>
+          </a:p>
+        </p:txBody>
+      </p:sp>
+      <p:sp>
+        <p:nvSpPr>
+          <p:cNvPr id="46" name="TextBox 45"/>
+          <p:cNvSpPr txBox="1"/>
+          <p:nvPr/>
+        </p:nvSpPr>
+        <p:spPr>
+          <a:xfrm rot="16200000">
+            <a:off x="4303150" y="2294963"/>
+            <a:ext cx="794898" cy="369332"/>
+          </a:xfrm>
+          <a:prstGeom prst="rect">
+            <a:avLst/>
+          </a:prstGeom>
+          <a:noFill/>
+        </p:spPr>
+        <p:txBody>
+          <a:bodyPr wrap="none" rtlCol="0">
+            <a:spAutoFit/>
+          </a:bodyPr>
+          <a:lstStyle/>
+          <a:p>
+            <a:r>
+              <a:rPr lang="en-US" smtClean="0"/>
+              <a:t>invalid</a:t>
+            </a:r>
+            <a:endParaRPr lang="en-US"/>
           </a:p>
         </p:txBody>
       </p:sp>
@@ -10707,13 +11268,18 @@
           <a:p>
             <a:pPr algn="ctr"/>
             <a:r>
-              <a:rPr lang="en-US" sz="3200" dirty="0">
+              <a:rPr lang="en-US" sz="3200" dirty="0" smtClean="0">
                 <a:solidFill>
                   <a:schemeClr val="tx1"/>
                 </a:solidFill>
               </a:rPr>
-              <a:t>code</a:t>
-            </a:r>
+              <a:t>action code</a:t>
+            </a:r>
+            <a:endParaRPr lang="en-US" sz="3200" dirty="0">
+              <a:solidFill>
+                <a:schemeClr val="tx1"/>
+              </a:solidFill>
+            </a:endParaRPr>
           </a:p>
         </p:txBody>
       </p:sp>
@@ -10759,13 +11325,33 @@
           <a:p>
             <a:pPr algn="ctr"/>
             <a:r>
-              <a:rPr lang="en-US" sz="3200" dirty="0">
+              <a:rPr lang="en-US" sz="2800" dirty="0" smtClean="0">
+                <a:solidFill>
+                  <a:schemeClr val="tx1"/>
+                </a:solidFill>
+              </a:rPr>
+              <a:t>action</a:t>
+            </a:r>
+            <a:br>
+              <a:rPr lang="en-US" sz="2800" dirty="0" smtClean="0">
+                <a:solidFill>
+                  <a:schemeClr val="tx1"/>
+                </a:solidFill>
+              </a:rPr>
+            </a:br>
+            <a:r>
+              <a:rPr lang="en-US" sz="2800" dirty="0" smtClean="0">
                 <a:solidFill>
                   <a:schemeClr val="tx1"/>
                 </a:solidFill>
               </a:rPr>
               <a:t>data</a:t>
             </a:r>
+            <a:endParaRPr lang="en-US" sz="2800" dirty="0">
+              <a:solidFill>
+                <a:schemeClr val="tx1"/>
+              </a:solidFill>
+            </a:endParaRPr>
           </a:p>
         </p:txBody>
       </p:sp>
@@ -10806,8 +11392,8 @@
         </p:nvSpPr>
         <p:spPr>
           <a:xfrm>
-            <a:off x="2322242" y="367735"/>
-            <a:ext cx="1615635" cy="461665"/>
+            <a:off x="1443589" y="605018"/>
+            <a:ext cx="1350946" cy="646331"/>
           </a:xfrm>
           <a:prstGeom prst="rect">
             <a:avLst/>
@@ -10820,10 +11406,27 @@
           </a:bodyPr>
           <a:lstStyle/>
           <a:p>
-            <a:r>
-              <a:rPr lang="en-US" sz="2400" dirty="0"/>
+            <a:pPr algn="r"/>
+            <a:r>
+              <a:rPr lang="en-US" dirty="0" smtClean="0"/>
+              <a:t>in/</a:t>
+            </a:r>
+            <a:r>
+              <a:rPr lang="en-US" dirty="0" err="1" smtClean="0"/>
+              <a:t>inout</a:t>
+            </a:r>
+            <a:r>
+              <a:rPr lang="en-US" dirty="0" smtClean="0"/>
+              <a:t>/out</a:t>
+            </a:r>
+            <a:br>
+              <a:rPr lang="en-US" dirty="0" smtClean="0"/>
+            </a:br>
+            <a:r>
+              <a:rPr lang="en-US" dirty="0" smtClean="0"/>
               <a:t>parameters</a:t>
             </a:r>
+            <a:endParaRPr lang="en-US" dirty="0"/>
           </a:p>
         </p:txBody>
       </p:sp>
@@ -10835,8 +11438,8 @@
         </p:nvSpPr>
         <p:spPr>
           <a:xfrm>
-            <a:off x="2539999" y="883139"/>
-            <a:ext cx="1180123" cy="578338"/>
+            <a:off x="2714123" y="467640"/>
+            <a:ext cx="708810" cy="993837"/>
           </a:xfrm>
           <a:prstGeom prst="upDownArrow">
             <a:avLst>
@@ -10935,6 +11538,157 @@
                 <a:schemeClr val="tx1"/>
               </a:solidFill>
             </a:endParaRPr>
+          </a:p>
+        </p:txBody>
+      </p:sp>
+      <p:sp>
+        <p:nvSpPr>
+          <p:cNvPr id="10" name="TextBox 9"/>
+          <p:cNvSpPr txBox="1"/>
+          <p:nvPr/>
+        </p:nvSpPr>
+        <p:spPr>
+          <a:xfrm>
+            <a:off x="2269632" y="-32594"/>
+            <a:ext cx="1720856" cy="523220"/>
+          </a:xfrm>
+          <a:prstGeom prst="rect">
+            <a:avLst/>
+          </a:prstGeom>
+          <a:noFill/>
+        </p:spPr>
+        <p:txBody>
+          <a:bodyPr wrap="none" rtlCol="0">
+            <a:spAutoFit/>
+          </a:bodyPr>
+          <a:lstStyle/>
+          <a:p>
+            <a:r>
+              <a:rPr lang="en-US" sz="2800" smtClean="0"/>
+              <a:t>data plane</a:t>
+            </a:r>
+            <a:endParaRPr lang="en-US" sz="2800" dirty="0"/>
+          </a:p>
+        </p:txBody>
+      </p:sp>
+      <p:sp>
+        <p:nvSpPr>
+          <p:cNvPr id="11" name="TextBox 10"/>
+          <p:cNvSpPr txBox="1"/>
+          <p:nvPr/>
+        </p:nvSpPr>
+        <p:spPr>
+          <a:xfrm>
+            <a:off x="4384091" y="-32594"/>
+            <a:ext cx="2110834" cy="523220"/>
+          </a:xfrm>
+          <a:prstGeom prst="rect">
+            <a:avLst/>
+          </a:prstGeom>
+          <a:noFill/>
+        </p:spPr>
+        <p:txBody>
+          <a:bodyPr wrap="none" rtlCol="0">
+            <a:spAutoFit/>
+          </a:bodyPr>
+          <a:lstStyle/>
+          <a:p>
+            <a:r>
+              <a:rPr lang="en-US" sz="2800" smtClean="0"/>
+              <a:t>control plane</a:t>
+            </a:r>
+            <a:endParaRPr lang="en-US" sz="2800" dirty="0"/>
+          </a:p>
+        </p:txBody>
+      </p:sp>
+      <p:sp>
+        <p:nvSpPr>
+          <p:cNvPr id="12" name="Left Arrow 11"/>
+          <p:cNvSpPr/>
+          <p:nvPr/>
+        </p:nvSpPr>
+        <p:spPr>
+          <a:xfrm rot="16200000">
+            <a:off x="5024227" y="658644"/>
+            <a:ext cx="949329" cy="641989"/>
+          </a:xfrm>
+          <a:prstGeom prst="leftArrow">
+            <a:avLst/>
+          </a:prstGeom>
+          <a:solidFill>
+            <a:schemeClr val="tx2">
+              <a:lumMod val="60000"/>
+              <a:lumOff val="40000"/>
+            </a:schemeClr>
+          </a:solidFill>
+          <a:ln w="38100" cmpd="sng">
+            <a:solidFill>
+              <a:schemeClr val="tx1"/>
+            </a:solidFill>
+          </a:ln>
+          <a:effectLst/>
+        </p:spPr>
+        <p:style>
+          <a:lnRef idx="1">
+            <a:schemeClr val="accent1"/>
+          </a:lnRef>
+          <a:fillRef idx="3">
+            <a:schemeClr val="accent1"/>
+          </a:fillRef>
+          <a:effectRef idx="2">
+            <a:schemeClr val="accent1"/>
+          </a:effectRef>
+          <a:fontRef idx="minor">
+            <a:schemeClr val="lt1"/>
+          </a:fontRef>
+        </p:style>
+        <p:txBody>
+          <a:bodyPr wrap="none" rtlCol="0" anchor="ctr"/>
+          <a:lstStyle/>
+          <a:p>
+            <a:pPr algn="ctr"/>
+            <a:endParaRPr lang="en-US" sz="3200" dirty="0">
+              <a:solidFill>
+                <a:schemeClr val="tx1"/>
+              </a:solidFill>
+            </a:endParaRPr>
+          </a:p>
+        </p:txBody>
+      </p:sp>
+      <p:sp>
+        <p:nvSpPr>
+          <p:cNvPr id="13" name="TextBox 12"/>
+          <p:cNvSpPr txBox="1"/>
+          <p:nvPr/>
+        </p:nvSpPr>
+        <p:spPr>
+          <a:xfrm>
+            <a:off x="5707444" y="467640"/>
+            <a:ext cx="1371081" cy="646331"/>
+          </a:xfrm>
+          <a:prstGeom prst="rect">
+            <a:avLst/>
+          </a:prstGeom>
+          <a:noFill/>
+        </p:spPr>
+        <p:txBody>
+          <a:bodyPr wrap="none" rtlCol="0">
+            <a:spAutoFit/>
+          </a:bodyPr>
+          <a:lstStyle/>
+          <a:p>
+            <a:r>
+              <a:rPr lang="en-US" dirty="0" smtClean="0"/>
+              <a:t>directionless</a:t>
+            </a:r>
+            <a:br>
+              <a:rPr lang="en-US" dirty="0" smtClean="0"/>
+            </a:br>
+            <a:r>
+              <a:rPr lang="en-US" dirty="0" smtClean="0"/>
+              <a:t>parameters</a:t>
+            </a:r>
+            <a:endParaRPr lang="en-US" dirty="0"/>
           </a:p>
         </p:txBody>
       </p:sp>
@@ -11670,11 +12424,7 @@
           <a:p>
             <a:r>
               <a:rPr lang="en-US" sz="2400" dirty="0" smtClean="0"/>
-              <a:t>package </a:t>
-            </a:r>
-            <a:r>
-              <a:rPr lang="en-US" sz="2400" dirty="0" smtClean="0"/>
-              <a:t>main</a:t>
+              <a:t>package main</a:t>
             </a:r>
             <a:endParaRPr lang="en-US" sz="2400" dirty="0"/>
           </a:p>

</xml_diff>